<commit_message>
tensorflow part done, inference part done
</commit_message>
<xml_diff>
--- a/text_classification.pptx
+++ b/text_classification.pptx
@@ -12,6 +12,8 @@
     <p:sldId id="259" r:id="rId6"/>
     <p:sldId id="261" r:id="rId7"/>
     <p:sldId id="262" r:id="rId8"/>
+    <p:sldId id="263" r:id="rId9"/>
+    <p:sldId id="264" r:id="rId10"/>
   </p:sldIdLst>
   <p:sldSz cx="12192000" cy="6858000"/>
   <p:notesSz cx="6858000" cy="9144000"/>
@@ -874,7 +876,7 @@
           <a:p>
             <a:fld id="{BF500664-3DCE-4D1F-84F4-FA249FC29169}" type="datetimeFigureOut">
               <a:rPr lang="en-US" smtClean="0"/>
-              <a:t>4/27/2018</a:t>
+              <a:t>4/28/2018</a:t>
             </a:fld>
             <a:endParaRPr lang="en-US"/>
           </a:p>
@@ -1125,7 +1127,7 @@
           <a:p>
             <a:fld id="{BF500664-3DCE-4D1F-84F4-FA249FC29169}" type="datetimeFigureOut">
               <a:rPr lang="en-US" smtClean="0"/>
-              <a:t>4/27/2018</a:t>
+              <a:t>4/28/2018</a:t>
             </a:fld>
             <a:endParaRPr lang="en-US"/>
           </a:p>
@@ -1439,7 +1441,7 @@
           <a:p>
             <a:fld id="{BF500664-3DCE-4D1F-84F4-FA249FC29169}" type="datetimeFigureOut">
               <a:rPr lang="en-US" smtClean="0"/>
-              <a:t>4/27/2018</a:t>
+              <a:t>4/28/2018</a:t>
             </a:fld>
             <a:endParaRPr lang="en-US"/>
           </a:p>
@@ -1772,7 +1774,7 @@
           <a:p>
             <a:fld id="{BF500664-3DCE-4D1F-84F4-FA249FC29169}" type="datetimeFigureOut">
               <a:rPr lang="en-US" smtClean="0"/>
-              <a:t>4/27/2018</a:t>
+              <a:t>4/28/2018</a:t>
             </a:fld>
             <a:endParaRPr lang="en-US"/>
           </a:p>
@@ -2086,7 +2088,7 @@
           <a:p>
             <a:fld id="{BF500664-3DCE-4D1F-84F4-FA249FC29169}" type="datetimeFigureOut">
               <a:rPr lang="en-US" smtClean="0"/>
-              <a:t>4/27/2018</a:t>
+              <a:t>4/28/2018</a:t>
             </a:fld>
             <a:endParaRPr lang="en-US"/>
           </a:p>
@@ -2479,7 +2481,7 @@
           <a:p>
             <a:fld id="{BF500664-3DCE-4D1F-84F4-FA249FC29169}" type="datetimeFigureOut">
               <a:rPr lang="en-US" smtClean="0"/>
-              <a:t>4/27/2018</a:t>
+              <a:t>4/28/2018</a:t>
             </a:fld>
             <a:endParaRPr lang="en-US"/>
           </a:p>
@@ -2649,7 +2651,7 @@
           <a:p>
             <a:fld id="{BF500664-3DCE-4D1F-84F4-FA249FC29169}" type="datetimeFigureOut">
               <a:rPr lang="en-US" smtClean="0"/>
-              <a:t>4/27/2018</a:t>
+              <a:t>4/28/2018</a:t>
             </a:fld>
             <a:endParaRPr lang="en-US"/>
           </a:p>
@@ -2829,7 +2831,7 @@
           <a:p>
             <a:fld id="{BF500664-3DCE-4D1F-84F4-FA249FC29169}" type="datetimeFigureOut">
               <a:rPr lang="en-US" smtClean="0"/>
-              <a:t>4/27/2018</a:t>
+              <a:t>4/28/2018</a:t>
             </a:fld>
             <a:endParaRPr lang="en-US"/>
           </a:p>
@@ -2999,7 +3001,7 @@
           <a:p>
             <a:fld id="{BF500664-3DCE-4D1F-84F4-FA249FC29169}" type="datetimeFigureOut">
               <a:rPr lang="en-US" smtClean="0"/>
-              <a:t>4/27/2018</a:t>
+              <a:t>4/28/2018</a:t>
             </a:fld>
             <a:endParaRPr lang="en-US"/>
           </a:p>
@@ -3246,7 +3248,7 @@
           <a:p>
             <a:fld id="{BF500664-3DCE-4D1F-84F4-FA249FC29169}" type="datetimeFigureOut">
               <a:rPr lang="en-US" smtClean="0"/>
-              <a:t>4/27/2018</a:t>
+              <a:t>4/28/2018</a:t>
             </a:fld>
             <a:endParaRPr lang="en-US"/>
           </a:p>
@@ -3478,7 +3480,7 @@
           <a:p>
             <a:fld id="{BF500664-3DCE-4D1F-84F4-FA249FC29169}" type="datetimeFigureOut">
               <a:rPr lang="en-US" smtClean="0"/>
-              <a:t>4/27/2018</a:t>
+              <a:t>4/28/2018</a:t>
             </a:fld>
             <a:endParaRPr lang="en-US"/>
           </a:p>
@@ -3852,7 +3854,7 @@
           <a:p>
             <a:fld id="{BF500664-3DCE-4D1F-84F4-FA249FC29169}" type="datetimeFigureOut">
               <a:rPr lang="en-US" smtClean="0"/>
-              <a:t>4/27/2018</a:t>
+              <a:t>4/28/2018</a:t>
             </a:fld>
             <a:endParaRPr lang="en-US"/>
           </a:p>
@@ -3975,7 +3977,7 @@
           <a:p>
             <a:fld id="{BF500664-3DCE-4D1F-84F4-FA249FC29169}" type="datetimeFigureOut">
               <a:rPr lang="en-US" smtClean="0"/>
-              <a:t>4/27/2018</a:t>
+              <a:t>4/28/2018</a:t>
             </a:fld>
             <a:endParaRPr lang="en-US"/>
           </a:p>
@@ -4070,7 +4072,7 @@
           <a:p>
             <a:fld id="{BF500664-3DCE-4D1F-84F4-FA249FC29169}" type="datetimeFigureOut">
               <a:rPr lang="en-US" smtClean="0"/>
-              <a:t>4/27/2018</a:t>
+              <a:t>4/28/2018</a:t>
             </a:fld>
             <a:endParaRPr lang="en-US"/>
           </a:p>
@@ -4325,7 +4327,7 @@
           <a:p>
             <a:fld id="{BF500664-3DCE-4D1F-84F4-FA249FC29169}" type="datetimeFigureOut">
               <a:rPr lang="en-US" smtClean="0"/>
-              <a:t>4/27/2018</a:t>
+              <a:t>4/28/2018</a:t>
             </a:fld>
             <a:endParaRPr lang="en-US"/>
           </a:p>
@@ -4630,7 +4632,7 @@
           <a:p>
             <a:fld id="{BF500664-3DCE-4D1F-84F4-FA249FC29169}" type="datetimeFigureOut">
               <a:rPr lang="en-US" smtClean="0"/>
-              <a:t>4/27/2018</a:t>
+              <a:t>4/28/2018</a:t>
             </a:fld>
             <a:endParaRPr lang="en-US"/>
           </a:p>
@@ -5332,7 +5334,7 @@
           <a:p>
             <a:fld id="{BF500664-3DCE-4D1F-84F4-FA249FC29169}" type="datetimeFigureOut">
               <a:rPr lang="en-US" smtClean="0"/>
-              <a:t>4/27/2018</a:t>
+              <a:t>4/28/2018</a:t>
             </a:fld>
             <a:endParaRPr lang="en-US"/>
           </a:p>
@@ -6342,6 +6344,13 @@
           </a:p>
           <a:p>
             <a:pPr lvl="1"/>
+            <a:r>
+              <a:rPr lang="en-US" dirty="0"/>
+              <a:t>129796 features</a:t>
+            </a:r>
+          </a:p>
+          <a:p>
+            <a:pPr lvl="1"/>
             <a:endParaRPr lang="en-US" dirty="0"/>
           </a:p>
         </p:txBody>
@@ -6524,13 +6533,28 @@
           <a:p>
             <a:r>
               <a:rPr lang="en-US" dirty="0"/>
-              <a:t>Accuracy: ~80.4% on </a:t>
-            </a:r>
-            <a:r>
-              <a:rPr lang="en-US"/>
-              <a:t>test set</a:t>
-            </a:r>
-            <a:endParaRPr lang="en-US" dirty="0"/>
+              <a:t>Model: </a:t>
+            </a:r>
+          </a:p>
+          <a:p>
+            <a:pPr lvl="1"/>
+            <a:r>
+              <a:rPr lang="en-US" dirty="0"/>
+              <a:t>5000 trees in the forest</a:t>
+            </a:r>
+          </a:p>
+          <a:p>
+            <a:pPr lvl="1"/>
+            <a:r>
+              <a:rPr lang="en-US" dirty="0"/>
+              <a:t>360 features to consider when looking for the best split</a:t>
+            </a:r>
+          </a:p>
+          <a:p>
+            <a:r>
+              <a:rPr lang="en-US" dirty="0"/>
+              <a:t>Accuracy: ~80.4% on test set</a:t>
+            </a:r>
           </a:p>
         </p:txBody>
       </p:sp>
@@ -6538,6 +6562,218 @@
     <p:extLst>
       <p:ext uri="{BB962C8B-B14F-4D97-AF65-F5344CB8AC3E}">
         <p14:creationId xmlns:p14="http://schemas.microsoft.com/office/powerpoint/2010/main" val="1934470528"/>
+      </p:ext>
+    </p:extLst>
+  </p:cSld>
+  <p:clrMapOvr>
+    <a:masterClrMapping/>
+  </p:clrMapOvr>
+</p:sld>
+</file>
+
+<file path=ppt/slides/slide8.xml><?xml version="1.0" encoding="utf-8"?>
+<p:sld xmlns:a="http://schemas.openxmlformats.org/drawingml/2006/main" xmlns:r="http://schemas.openxmlformats.org/officeDocument/2006/relationships" xmlns:p="http://schemas.openxmlformats.org/presentationml/2006/main">
+  <p:cSld>
+    <p:spTree>
+      <p:nvGrpSpPr>
+        <p:cNvPr id="1" name=""/>
+        <p:cNvGrpSpPr/>
+        <p:nvPr/>
+      </p:nvGrpSpPr>
+      <p:grpSpPr>
+        <a:xfrm>
+          <a:off x="0" y="0"/>
+          <a:ext cx="0" cy="0"/>
+          <a:chOff x="0" y="0"/>
+          <a:chExt cx="0" cy="0"/>
+        </a:xfrm>
+      </p:grpSpPr>
+      <p:sp>
+        <p:nvSpPr>
+          <p:cNvPr id="2" name="Title 1">
+            <a:extLst>
+              <a:ext uri="{FF2B5EF4-FFF2-40B4-BE49-F238E27FC236}">
+                <a16:creationId xmlns:a16="http://schemas.microsoft.com/office/drawing/2014/main" id="{5F0F2349-0B59-435C-B488-402B918F1310}"/>
+              </a:ext>
+            </a:extLst>
+          </p:cNvPr>
+          <p:cNvSpPr>
+            <a:spLocks noGrp="1"/>
+          </p:cNvSpPr>
+          <p:nvPr>
+            <p:ph type="title"/>
+          </p:nvPr>
+        </p:nvSpPr>
+        <p:spPr/>
+        <p:txBody>
+          <a:bodyPr/>
+          <a:lstStyle/>
+          <a:p>
+            <a:r>
+              <a:rPr lang="en-US" dirty="0"/>
+              <a:t>Multiple Layer Perceptron</a:t>
+            </a:r>
+          </a:p>
+        </p:txBody>
+      </p:sp>
+      <p:sp>
+        <p:nvSpPr>
+          <p:cNvPr id="3" name="Content Placeholder 2">
+            <a:extLst>
+              <a:ext uri="{FF2B5EF4-FFF2-40B4-BE49-F238E27FC236}">
+                <a16:creationId xmlns:a16="http://schemas.microsoft.com/office/drawing/2014/main" id="{44DFF11B-904E-43D8-827F-7572D4795BA2}"/>
+              </a:ext>
+            </a:extLst>
+          </p:cNvPr>
+          <p:cNvSpPr>
+            <a:spLocks noGrp="1"/>
+          </p:cNvSpPr>
+          <p:nvPr>
+            <p:ph idx="1"/>
+          </p:nvPr>
+        </p:nvSpPr>
+        <p:spPr/>
+        <p:txBody>
+          <a:bodyPr/>
+          <a:lstStyle/>
+          <a:p>
+            <a:r>
+              <a:rPr lang="en-US" dirty="0"/>
+              <a:t>Neural network with 2 fully connected layers</a:t>
+            </a:r>
+          </a:p>
+          <a:p>
+            <a:r>
+              <a:rPr lang="en-US" dirty="0"/>
+              <a:t>Mini-batch training with batch size of 64</a:t>
+            </a:r>
+          </a:p>
+          <a:p>
+            <a:r>
+              <a:rPr lang="en-US" dirty="0"/>
+              <a:t>Accuracy: ~84% after only 1000 steps</a:t>
+            </a:r>
+          </a:p>
+          <a:p>
+            <a:r>
+              <a:rPr lang="en-US" dirty="0"/>
+              <a:t>Uses </a:t>
+            </a:r>
+            <a:r>
+              <a:rPr lang="en-US" dirty="0" err="1"/>
+              <a:t>AdamOptimizer</a:t>
+            </a:r>
+            <a:r>
+              <a:rPr lang="en-US" dirty="0"/>
+              <a:t> </a:t>
+            </a:r>
+          </a:p>
+          <a:p>
+            <a:r>
+              <a:rPr lang="en-US" dirty="0"/>
+              <a:t>Loss Function: sparse </a:t>
+            </a:r>
+            <a:r>
+              <a:rPr lang="en-US" dirty="0" err="1"/>
+              <a:t>softmax</a:t>
+            </a:r>
+            <a:r>
+              <a:rPr lang="en-US" dirty="0"/>
+              <a:t> cross entropy</a:t>
+            </a:r>
+          </a:p>
+        </p:txBody>
+      </p:sp>
+    </p:spTree>
+    <p:extLst>
+      <p:ext uri="{BB962C8B-B14F-4D97-AF65-F5344CB8AC3E}">
+        <p14:creationId xmlns:p14="http://schemas.microsoft.com/office/powerpoint/2010/main" val="3621944892"/>
+      </p:ext>
+    </p:extLst>
+  </p:cSld>
+  <p:clrMapOvr>
+    <a:masterClrMapping/>
+  </p:clrMapOvr>
+</p:sld>
+</file>
+
+<file path=ppt/slides/slide9.xml><?xml version="1.0" encoding="utf-8"?>
+<p:sld xmlns:a="http://schemas.openxmlformats.org/drawingml/2006/main" xmlns:r="http://schemas.openxmlformats.org/officeDocument/2006/relationships" xmlns:p="http://schemas.openxmlformats.org/presentationml/2006/main">
+  <p:cSld>
+    <p:spTree>
+      <p:nvGrpSpPr>
+        <p:cNvPr id="1" name=""/>
+        <p:cNvGrpSpPr/>
+        <p:nvPr/>
+      </p:nvGrpSpPr>
+      <p:grpSpPr>
+        <a:xfrm>
+          <a:off x="0" y="0"/>
+          <a:ext cx="0" cy="0"/>
+          <a:chOff x="0" y="0"/>
+          <a:chExt cx="0" cy="0"/>
+        </a:xfrm>
+      </p:grpSpPr>
+      <p:sp>
+        <p:nvSpPr>
+          <p:cNvPr id="2" name="Title 1">
+            <a:extLst>
+              <a:ext uri="{FF2B5EF4-FFF2-40B4-BE49-F238E27FC236}">
+                <a16:creationId xmlns:a16="http://schemas.microsoft.com/office/drawing/2014/main" id="{DE75F8A0-9398-4701-8109-B3B043D268D7}"/>
+              </a:ext>
+            </a:extLst>
+          </p:cNvPr>
+          <p:cNvSpPr>
+            <a:spLocks noGrp="1"/>
+          </p:cNvSpPr>
+          <p:nvPr>
+            <p:ph type="title"/>
+          </p:nvPr>
+        </p:nvSpPr>
+        <p:spPr/>
+        <p:txBody>
+          <a:bodyPr/>
+          <a:lstStyle/>
+          <a:p>
+            <a:r>
+              <a:rPr lang="en-US" dirty="0"/>
+              <a:t>Conclusion</a:t>
+            </a:r>
+          </a:p>
+        </p:txBody>
+      </p:sp>
+      <p:sp>
+        <p:nvSpPr>
+          <p:cNvPr id="6" name="Content Placeholder 5">
+            <a:extLst>
+              <a:ext uri="{FF2B5EF4-FFF2-40B4-BE49-F238E27FC236}">
+                <a16:creationId xmlns:a16="http://schemas.microsoft.com/office/drawing/2014/main" id="{F61D4917-F58C-4597-8535-04074C9D9E69}"/>
+              </a:ext>
+            </a:extLst>
+          </p:cNvPr>
+          <p:cNvSpPr>
+            <a:spLocks noGrp="1"/>
+          </p:cNvSpPr>
+          <p:nvPr>
+            <p:ph idx="1"/>
+          </p:nvPr>
+        </p:nvSpPr>
+        <p:spPr/>
+        <p:txBody>
+          <a:bodyPr/>
+          <a:lstStyle/>
+          <a:p>
+            <a:r>
+              <a:rPr lang="en-US" dirty="0"/>
+              <a:t>The model that uses MLP is faster to train, uses a lot less computer resources and has a higher accuracy on the test set</a:t>
+            </a:r>
+          </a:p>
+        </p:txBody>
+      </p:sp>
+    </p:spTree>
+    <p:extLst>
+      <p:ext uri="{BB962C8B-B14F-4D97-AF65-F5344CB8AC3E}">
+        <p14:creationId xmlns:p14="http://schemas.microsoft.com/office/powerpoint/2010/main" val="1768397938"/>
       </p:ext>
     </p:extLst>
   </p:cSld>

</xml_diff>